<commit_message>
Atualiza imagem do fluxograma no capítulo 1
</commit_message>
<xml_diff>
--- a/images/fluxograma.pptx
+++ b/images/fluxograma.pptx
@@ -2997,10 +2997,6 @@
               <a:rPr lang="pt-BR" dirty="0"/>
               <a:t>Fim</a:t>
             </a:r>
-            <a:r>
-              <a:rPr lang="pt-BR" dirty="0"/>
-              <a:t/>
-            </a:r>
             <a:br>
               <a:rPr lang="pt-BR" dirty="0"/>
             </a:br>
@@ -3151,7 +3147,6 @@
               <a:rPr lang="pt-BR" dirty="0"/>
               <a:t>Sim</a:t>
             </a:r>
-            <a:endParaRPr lang="pt-BR" dirty="0"/>
           </a:p>
         </p:txBody>
       </p:sp>
@@ -3434,8 +3429,20 @@
             </a:r>
             <a:r>
               <a:rPr lang="en-US" dirty="0"/>
-              <a:t> que 10?</a:t>
-            </a:r>
+              <a:t> que 10</a:t>
+            </a:r>
+            <a:r>
+              <a:rPr lang="en-US" dirty="0" smtClean="0"/>
+              <a:t>?</a:t>
+            </a:r>
+          </a:p>
+          <a:p>
+            <a:pPr algn="ctr"/>
+            <a:r>
+              <a:rPr lang="pt-BR" sz="1400" dirty="0"/>
+              <a:t>🤔</a:t>
+            </a:r>
+            <a:endParaRPr lang="en-US" dirty="0"/>
           </a:p>
         </p:txBody>
       </p:sp>
@@ -3575,7 +3582,6 @@
               <a:rPr lang="pt-BR" dirty="0"/>
               <a:t>Não</a:t>
             </a:r>
-            <a:endParaRPr lang="pt-BR" dirty="0"/>
           </a:p>
         </p:txBody>
       </p:sp>

</xml_diff>